<commit_message>
added ppt for 4180
</commit_message>
<xml_diff>
--- a/readings/storytelling.pptx
+++ b/readings/storytelling.pptx
@@ -6,10 +6,15 @@
   </p:sldMasterIdLst>
   <p:sldIdLst>
     <p:sldId id="256" r:id="rId2"/>
-    <p:sldId id="258" r:id="rId3"/>
-    <p:sldId id="257" r:id="rId4"/>
+    <p:sldId id="262" r:id="rId3"/>
+    <p:sldId id="258" r:id="rId4"/>
     <p:sldId id="259" r:id="rId5"/>
-    <p:sldId id="260" r:id="rId6"/>
+    <p:sldId id="261" r:id="rId6"/>
+    <p:sldId id="263" r:id="rId7"/>
+    <p:sldId id="257" r:id="rId8"/>
+    <p:sldId id="260" r:id="rId9"/>
+    <p:sldId id="264" r:id="rId10"/>
+    <p:sldId id="265" r:id="rId11"/>
   </p:sldIdLst>
   <p:sldSz cx="9144000" cy="6858000" type="screen4x3"/>
   <p:notesSz cx="6858000" cy="9144000"/>
@@ -547,7 +552,7 @@
           <a:p>
             <a:fld id="{7D290233-0DD1-4A80-BB1E-9ADC3556DBB6}" type="datetimeFigureOut">
               <a:rPr lang="en-US" smtClean="0"/>
-              <a:t>10/9/15</a:t>
+              <a:t>10/12/15</a:t>
             </a:fld>
             <a:endParaRPr lang="en-US"/>
           </a:p>
@@ -1158,7 +1163,7 @@
           <a:p>
             <a:fld id="{7D290233-0DD1-4A80-BB1E-9ADC3556DBB6}" type="datetimeFigureOut">
               <a:rPr lang="en-US" smtClean="0"/>
-              <a:t>10/9/15</a:t>
+              <a:t>10/12/15</a:t>
             </a:fld>
             <a:endParaRPr lang="en-US"/>
           </a:p>
@@ -1730,7 +1735,7 @@
           <a:p>
             <a:fld id="{7D290233-0DD1-4A80-BB1E-9ADC3556DBB6}" type="datetimeFigureOut">
               <a:rPr lang="en-US" smtClean="0"/>
-              <a:t>10/9/15</a:t>
+              <a:t>10/12/15</a:t>
             </a:fld>
             <a:endParaRPr lang="en-US"/>
           </a:p>
@@ -2264,7 +2269,7 @@
           <a:p>
             <a:fld id="{7D290233-0DD1-4A80-BB1E-9ADC3556DBB6}" type="datetimeFigureOut">
               <a:rPr lang="en-US" smtClean="0"/>
-              <a:t>10/9/15</a:t>
+              <a:t>10/12/15</a:t>
             </a:fld>
             <a:endParaRPr lang="en-US"/>
           </a:p>
@@ -2666,7 +2671,7 @@
           <a:p>
             <a:fld id="{7D290233-0DD1-4A80-BB1E-9ADC3556DBB6}" type="datetimeFigureOut">
               <a:rPr lang="en-US" smtClean="0"/>
-              <a:t>10/9/15</a:t>
+              <a:t>10/12/15</a:t>
             </a:fld>
             <a:endParaRPr lang="en-US"/>
           </a:p>
@@ -3099,7 +3104,7 @@
           <a:p>
             <a:fld id="{7D290233-0DD1-4A80-BB1E-9ADC3556DBB6}" type="datetimeFigureOut">
               <a:rPr lang="en-US" smtClean="0"/>
-              <a:t>10/9/15</a:t>
+              <a:t>10/12/15</a:t>
             </a:fld>
             <a:endParaRPr lang="en-US"/>
           </a:p>
@@ -3501,7 +3506,7 @@
           <a:p>
             <a:fld id="{7D290233-0DD1-4A80-BB1E-9ADC3556DBB6}" type="datetimeFigureOut">
               <a:rPr lang="en-US" smtClean="0"/>
-              <a:t>10/9/15</a:t>
+              <a:t>10/12/15</a:t>
             </a:fld>
             <a:endParaRPr lang="en-US"/>
           </a:p>
@@ -3975,7 +3980,7 @@
           <a:p>
             <a:fld id="{7D290233-0DD1-4A80-BB1E-9ADC3556DBB6}" type="datetimeFigureOut">
               <a:rPr lang="en-US" smtClean="0"/>
-              <a:t>10/9/15</a:t>
+              <a:t>10/12/15</a:t>
             </a:fld>
             <a:endParaRPr lang="en-US"/>
           </a:p>
@@ -4425,7 +4430,7 @@
           <a:p>
             <a:fld id="{7D290233-0DD1-4A80-BB1E-9ADC3556DBB6}" type="datetimeFigureOut">
               <a:rPr lang="en-US" smtClean="0"/>
-              <a:t>10/9/15</a:t>
+              <a:t>10/12/15</a:t>
             </a:fld>
             <a:endParaRPr lang="en-US"/>
           </a:p>
@@ -4945,7 +4950,7 @@
           <a:p>
             <a:fld id="{7D290233-0DD1-4A80-BB1E-9ADC3556DBB6}" type="datetimeFigureOut">
               <a:rPr lang="en-US" smtClean="0"/>
-              <a:t>10/9/15</a:t>
+              <a:t>10/12/15</a:t>
             </a:fld>
             <a:endParaRPr lang="en-US"/>
           </a:p>
@@ -5665,7 +5670,7 @@
           <a:p>
             <a:fld id="{7D290233-0DD1-4A80-BB1E-9ADC3556DBB6}" type="datetimeFigureOut">
               <a:rPr lang="en-US" smtClean="0"/>
-              <a:t>10/9/15</a:t>
+              <a:t>10/12/15</a:t>
             </a:fld>
             <a:endParaRPr lang="en-US"/>
           </a:p>
@@ -6011,7 +6016,7 @@
           <a:p>
             <a:fld id="{7D290233-0DD1-4A80-BB1E-9ADC3556DBB6}" type="datetimeFigureOut">
               <a:rPr lang="en-US" smtClean="0"/>
-              <a:t>10/9/15</a:t>
+              <a:t>10/12/15</a:t>
             </a:fld>
             <a:endParaRPr lang="en-US"/>
           </a:p>
@@ -6280,7 +6285,7 @@
           <a:p>
             <a:fld id="{7D290233-0DD1-4A80-BB1E-9ADC3556DBB6}" type="datetimeFigureOut">
               <a:rPr lang="en-US" smtClean="0"/>
-              <a:t>10/9/15</a:t>
+              <a:t>10/12/15</a:t>
             </a:fld>
             <a:endParaRPr lang="en-US"/>
           </a:p>
@@ -6837,7 +6842,7 @@
           <a:p>
             <a:fld id="{7D290233-0DD1-4A80-BB1E-9ADC3556DBB6}" type="datetimeFigureOut">
               <a:rPr lang="en-US" smtClean="0"/>
-              <a:t>10/9/15</a:t>
+              <a:t>10/12/15</a:t>
             </a:fld>
             <a:endParaRPr lang="en-US"/>
           </a:p>
@@ -7047,7 +7052,7 @@
           <a:p>
             <a:fld id="{7D290233-0DD1-4A80-BB1E-9ADC3556DBB6}" type="datetimeFigureOut">
               <a:rPr lang="en-US" smtClean="0"/>
-              <a:t>10/9/15</a:t>
+              <a:t>10/12/15</a:t>
             </a:fld>
             <a:endParaRPr lang="en-US"/>
           </a:p>
@@ -7529,7 +7534,15 @@
           <a:p>
             <a:r>
               <a:rPr lang="en-US" dirty="0" smtClean="0"/>
-              <a:t>Storytelling in Visualizations	</a:t>
+              <a:t>Storytelling </a:t>
+            </a:r>
+            <a:r>
+              <a:rPr lang="en-US" dirty="0" smtClean="0"/>
+              <a:t>with Data</a:t>
+            </a:r>
+            <a:r>
+              <a:rPr lang="en-US" dirty="0" smtClean="0"/>
+              <a:t>	</a:t>
             </a:r>
             <a:endParaRPr lang="en-US" dirty="0"/>
           </a:p>
@@ -7568,6 +7581,80 @@
     <p:extLst>
       <p:ext uri="{BB962C8B-B14F-4D97-AF65-F5344CB8AC3E}">
         <p14:creationId xmlns:p14="http://schemas.microsoft.com/office/powerpoint/2010/main" val="298273043"/>
+      </p:ext>
+    </p:extLst>
+  </p:cSld>
+  <p:clrMapOvr>
+    <a:masterClrMapping/>
+  </p:clrMapOvr>
+</p:sld>
+</file>
+
+<file path=ppt/slides/slide10.xml><?xml version="1.0" encoding="utf-8"?>
+<p:sld xmlns:a="http://schemas.openxmlformats.org/drawingml/2006/main" xmlns:r="http://schemas.openxmlformats.org/officeDocument/2006/relationships" xmlns:p="http://schemas.openxmlformats.org/presentationml/2006/main">
+  <p:cSld>
+    <p:spTree>
+      <p:nvGrpSpPr>
+        <p:cNvPr id="1" name=""/>
+        <p:cNvGrpSpPr/>
+        <p:nvPr/>
+      </p:nvGrpSpPr>
+      <p:grpSpPr>
+        <a:xfrm>
+          <a:off x="0" y="0"/>
+          <a:ext cx="0" cy="0"/>
+          <a:chOff x="0" y="0"/>
+          <a:chExt cx="0" cy="0"/>
+        </a:xfrm>
+      </p:grpSpPr>
+      <p:sp>
+        <p:nvSpPr>
+          <p:cNvPr id="2" name="Title 1"/>
+          <p:cNvSpPr>
+            <a:spLocks noGrp="1"/>
+          </p:cNvSpPr>
+          <p:nvPr>
+            <p:ph type="title"/>
+          </p:nvPr>
+        </p:nvSpPr>
+        <p:spPr/>
+        <p:txBody>
+          <a:bodyPr>
+            <a:normAutofit fontScale="90000"/>
+          </a:bodyPr>
+          <a:lstStyle/>
+          <a:p>
+            <a:r>
+              <a:rPr lang="en-US" dirty="0" smtClean="0"/>
+              <a:t>What is the story that your data tells?</a:t>
+            </a:r>
+            <a:endParaRPr lang="en-US" dirty="0"/>
+          </a:p>
+        </p:txBody>
+      </p:sp>
+      <p:sp>
+        <p:nvSpPr>
+          <p:cNvPr id="3" name="Content Placeholder 2"/>
+          <p:cNvSpPr>
+            <a:spLocks noGrp="1"/>
+          </p:cNvSpPr>
+          <p:nvPr>
+            <p:ph idx="1"/>
+          </p:nvPr>
+        </p:nvSpPr>
+        <p:spPr/>
+        <p:txBody>
+          <a:bodyPr/>
+          <a:lstStyle/>
+          <a:p>
+            <a:endParaRPr lang="en-US" dirty="0"/>
+          </a:p>
+        </p:txBody>
+      </p:sp>
+    </p:spTree>
+    <p:extLst>
+      <p:ext uri="{BB962C8B-B14F-4D97-AF65-F5344CB8AC3E}">
+        <p14:creationId xmlns:p14="http://schemas.microsoft.com/office/powerpoint/2010/main" val="1318995898"/>
       </p:ext>
     </p:extLst>
   </p:cSld>
@@ -7606,12 +7693,18 @@
         </p:nvSpPr>
         <p:spPr/>
         <p:txBody>
-          <a:bodyPr/>
+          <a:bodyPr>
+            <a:normAutofit fontScale="90000"/>
+          </a:bodyPr>
           <a:lstStyle/>
           <a:p>
             <a:r>
               <a:rPr lang="en-US" dirty="0" smtClean="0"/>
-              <a:t>What makes a good story?</a:t>
+              <a:t>Three elements to a successful </a:t>
+            </a:r>
+            <a:r>
+              <a:rPr lang="en-US" dirty="0" err="1" smtClean="0"/>
+              <a:t>infographic</a:t>
             </a:r>
             <a:endParaRPr lang="en-US" dirty="0"/>
           </a:p>
@@ -7629,21 +7722,97 @@
         </p:nvSpPr>
         <p:spPr/>
         <p:txBody>
-          <a:bodyPr/>
+          <a:bodyPr>
+            <a:normAutofit fontScale="92500" lnSpcReduction="10000"/>
+          </a:bodyPr>
           <a:lstStyle/>
           <a:p>
+            <a:pPr marL="457200" indent="-457200">
+              <a:buFont typeface="+mj-lt"/>
+              <a:buAutoNum type="arabicPeriod"/>
+            </a:pPr>
             <a:r>
               <a:rPr lang="en-US" dirty="0" smtClean="0"/>
-              <a:t>Poll</a:t>
-            </a:r>
+              <a:t>Understands audience</a:t>
+            </a:r>
+          </a:p>
+          <a:p>
+            <a:pPr marL="693738" lvl="1" indent="-457200"/>
+            <a:r>
+              <a:rPr lang="en-US" dirty="0" smtClean="0"/>
+              <a:t>Anderson page 62 communication goals worksheet due with Project 2</a:t>
+            </a:r>
+          </a:p>
+          <a:p>
+            <a:pPr marL="457200" indent="-457200">
+              <a:buFont typeface="+mj-lt"/>
+              <a:buAutoNum type="arabicPeriod"/>
+            </a:pPr>
+            <a:r>
+              <a:rPr lang="en-US" dirty="0" smtClean="0"/>
+              <a:t>A clear framework</a:t>
+            </a:r>
+          </a:p>
+          <a:p>
+            <a:pPr marL="693738" lvl="1" indent="-457200"/>
+            <a:r>
+              <a:rPr lang="en-US" dirty="0" smtClean="0"/>
+              <a:t>Essentially, what is the data? Is it clear to everyone? What parts of the data will need explaining?</a:t>
+            </a:r>
+          </a:p>
+          <a:p>
+            <a:pPr marL="457200" indent="-457200">
+              <a:buFont typeface="+mj-lt"/>
+              <a:buAutoNum type="arabicPeriod"/>
+            </a:pPr>
+            <a:r>
+              <a:rPr lang="en-US" dirty="0" smtClean="0"/>
+              <a:t>It tells a story</a:t>
+            </a:r>
+          </a:p>
+          <a:p>
+            <a:pPr marL="457200" indent="-457200">
+              <a:buFont typeface="+mj-lt"/>
+              <a:buAutoNum type="arabicPeriod"/>
+            </a:pPr>
             <a:endParaRPr lang="en-US" dirty="0"/>
+          </a:p>
+          <a:p>
+            <a:pPr marL="0" indent="0">
+              <a:buNone/>
+            </a:pPr>
+            <a:r>
+              <a:rPr lang="en-US" sz="1400" dirty="0" smtClean="0"/>
+              <a:t>From Harvard Business Review (https</a:t>
+            </a:r>
+            <a:r>
+              <a:rPr lang="en-US" sz="1400" dirty="0"/>
+              <a:t>://</a:t>
+            </a:r>
+            <a:r>
+              <a:rPr lang="en-US" sz="1400" dirty="0" err="1"/>
+              <a:t>hbr.org</a:t>
+            </a:r>
+            <a:r>
+              <a:rPr lang="en-US" sz="1400" dirty="0"/>
+              <a:t>/2013/04/the-three-elements-of-</a:t>
+            </a:r>
+            <a:r>
+              <a:rPr lang="en-US" sz="1400" dirty="0" err="1" smtClean="0"/>
+              <a:t>successf</a:t>
+            </a:r>
+            <a:r>
+              <a:rPr lang="en-US" sz="1400" dirty="0" smtClean="0"/>
+              <a:t>)</a:t>
+            </a:r>
+            <a:endParaRPr lang="en-US" sz="1400" dirty="0"/>
           </a:p>
         </p:txBody>
       </p:sp>
     </p:spTree>
     <p:extLst>
       <p:ext uri="{BB962C8B-B14F-4D97-AF65-F5344CB8AC3E}">
-        <p14:creationId xmlns:p14="http://schemas.microsoft.com/office/powerpoint/2010/main" val="3149415008"/>
+        <p14:creationId xmlns:p14="http://schemas.microsoft.com/office/powerpoint/2010/main" val="2333993795"/>
       </p:ext>
     </p:extLst>
   </p:cSld>
@@ -7687,7 +7856,7 @@
           <a:p>
             <a:r>
               <a:rPr lang="en-US" dirty="0" smtClean="0"/>
-              <a:t>Elements of a story</a:t>
+              <a:t>What makes a good story?</a:t>
             </a:r>
             <a:endParaRPr lang="en-US" dirty="0"/>
           </a:p>
@@ -7710,30 +7879,16 @@
           <a:p>
             <a:r>
               <a:rPr lang="en-US" dirty="0" smtClean="0"/>
-              <a:t>Point of view</a:t>
-            </a:r>
-          </a:p>
-          <a:p>
-            <a:r>
-              <a:rPr lang="en-US" dirty="0" smtClean="0"/>
-              <a:t>Dramatic Question</a:t>
-            </a:r>
-          </a:p>
-          <a:p>
-            <a:r>
-              <a:rPr lang="en-US" dirty="0" smtClean="0"/>
-              <a:t>Emotional content</a:t>
-            </a:r>
-          </a:p>
-          <a:p>
-            <a:endParaRPr lang="en-US" dirty="0" smtClean="0"/>
+              <a:t>Poll</a:t>
+            </a:r>
+            <a:endParaRPr lang="en-US" dirty="0"/>
           </a:p>
         </p:txBody>
       </p:sp>
     </p:spTree>
     <p:extLst>
       <p:ext uri="{BB962C8B-B14F-4D97-AF65-F5344CB8AC3E}">
-        <p14:creationId xmlns:p14="http://schemas.microsoft.com/office/powerpoint/2010/main" val="2457425100"/>
+        <p14:creationId xmlns:p14="http://schemas.microsoft.com/office/powerpoint/2010/main" val="3149415008"/>
       </p:ext>
     </p:extLst>
   </p:cSld>
@@ -7816,6 +7971,14 @@
             <a:endParaRPr lang="en-US" dirty="0"/>
           </a:p>
           <a:p>
+            <a:r>
+              <a:rPr lang="en-US" dirty="0" smtClean="0"/>
+              <a:t>What is the introduction</a:t>
+            </a:r>
+            <a:r>
+              <a:rPr lang="en-US" smtClean="0"/>
+              <a:t>/need?</a:t>
+            </a:r>
             <a:endParaRPr lang="en-US" dirty="0"/>
           </a:p>
         </p:txBody>
@@ -7865,6 +8028,310 @@
           <a:bodyPr/>
           <a:lstStyle/>
           <a:p>
+            <a:r>
+              <a:rPr lang="en-US" dirty="0" smtClean="0"/>
+              <a:t>Parts of a Story</a:t>
+            </a:r>
+            <a:endParaRPr lang="en-US" dirty="0"/>
+          </a:p>
+        </p:txBody>
+      </p:sp>
+      <p:sp>
+        <p:nvSpPr>
+          <p:cNvPr id="3" name="Content Placeholder 2"/>
+          <p:cNvSpPr>
+            <a:spLocks noGrp="1"/>
+          </p:cNvSpPr>
+          <p:nvPr>
+            <p:ph idx="1"/>
+          </p:nvPr>
+        </p:nvSpPr>
+        <p:spPr/>
+        <p:txBody>
+          <a:bodyPr/>
+          <a:lstStyle/>
+          <a:p>
+            <a:r>
+              <a:rPr lang="en-US" dirty="0" smtClean="0"/>
+              <a:t>Introduction to the situation</a:t>
+            </a:r>
+          </a:p>
+          <a:p>
+            <a:r>
+              <a:rPr lang="en-US" dirty="0" smtClean="0"/>
+              <a:t>A series of events involving tension or conflict</a:t>
+            </a:r>
+          </a:p>
+          <a:p>
+            <a:r>
+              <a:rPr lang="en-US" dirty="0" smtClean="0"/>
+              <a:t>Resolution</a:t>
+            </a:r>
+          </a:p>
+        </p:txBody>
+      </p:sp>
+    </p:spTree>
+    <p:extLst>
+      <p:ext uri="{BB962C8B-B14F-4D97-AF65-F5344CB8AC3E}">
+        <p14:creationId xmlns:p14="http://schemas.microsoft.com/office/powerpoint/2010/main" val="281591566"/>
+      </p:ext>
+    </p:extLst>
+  </p:cSld>
+  <p:clrMapOvr>
+    <a:masterClrMapping/>
+  </p:clrMapOvr>
+</p:sld>
+</file>
+
+<file path=ppt/slides/slide6.xml><?xml version="1.0" encoding="utf-8"?>
+<p:sld xmlns:a="http://schemas.openxmlformats.org/drawingml/2006/main" xmlns:r="http://schemas.openxmlformats.org/officeDocument/2006/relationships" xmlns:p="http://schemas.openxmlformats.org/presentationml/2006/main">
+  <p:cSld>
+    <p:spTree>
+      <p:nvGrpSpPr>
+        <p:cNvPr id="1" name=""/>
+        <p:cNvGrpSpPr/>
+        <p:nvPr/>
+      </p:nvGrpSpPr>
+      <p:grpSpPr>
+        <a:xfrm>
+          <a:off x="0" y="0"/>
+          <a:ext cx="0" cy="0"/>
+          <a:chOff x="0" y="0"/>
+          <a:chExt cx="0" cy="0"/>
+        </a:xfrm>
+      </p:grpSpPr>
+      <p:sp>
+        <p:nvSpPr>
+          <p:cNvPr id="2" name="Title 1"/>
+          <p:cNvSpPr>
+            <a:spLocks noGrp="1"/>
+          </p:cNvSpPr>
+          <p:nvPr>
+            <p:ph type="title"/>
+          </p:nvPr>
+        </p:nvSpPr>
+        <p:spPr/>
+        <p:txBody>
+          <a:bodyPr>
+            <a:normAutofit fontScale="90000"/>
+          </a:bodyPr>
+          <a:lstStyle/>
+          <a:p>
+            <a:r>
+              <a:rPr lang="en-US" dirty="0" smtClean="0"/>
+              <a:t>Let’s First Start With Narrative</a:t>
+            </a:r>
+            <a:endParaRPr lang="en-US" dirty="0"/>
+          </a:p>
+        </p:txBody>
+      </p:sp>
+      <p:sp>
+        <p:nvSpPr>
+          <p:cNvPr id="3" name="Content Placeholder 2"/>
+          <p:cNvSpPr>
+            <a:spLocks noGrp="1"/>
+          </p:cNvSpPr>
+          <p:nvPr>
+            <p:ph idx="1"/>
+          </p:nvPr>
+        </p:nvSpPr>
+        <p:spPr/>
+        <p:txBody>
+          <a:bodyPr/>
+          <a:lstStyle/>
+          <a:p>
+            <a:pPr marL="0" indent="0" algn="ctr">
+              <a:buNone/>
+            </a:pPr>
+            <a:r>
+              <a:rPr lang="en-US" i="1" dirty="0"/>
+              <a:t>N</a:t>
+            </a:r>
+            <a:r>
+              <a:rPr lang="en-US" i="1" dirty="0" smtClean="0"/>
+              <a:t>arrative </a:t>
+            </a:r>
+            <a:r>
+              <a:rPr lang="en-US" dirty="0" smtClean="0"/>
+              <a:t>is defined as</a:t>
+            </a:r>
+          </a:p>
+          <a:p>
+            <a:pPr algn="ctr"/>
+            <a:endParaRPr lang="en-US" dirty="0"/>
+          </a:p>
+          <a:p>
+            <a:pPr marL="0" indent="0" algn="ctr">
+              <a:buNone/>
+            </a:pPr>
+            <a:r>
+              <a:rPr lang="en-US" dirty="0" smtClean="0"/>
+              <a:t>“</a:t>
+            </a:r>
+            <a:r>
+              <a:rPr lang="en-US" dirty="0"/>
+              <a:t>an account of a series of events, facts, etc., given in order and with the establishing of </a:t>
+            </a:r>
+            <a:r>
+              <a:rPr lang="en-US" b="1" dirty="0"/>
+              <a:t>connections</a:t>
+            </a:r>
+            <a:r>
+              <a:rPr lang="en-US" dirty="0"/>
+              <a:t> between them.” </a:t>
+            </a:r>
+          </a:p>
+          <a:p>
+            <a:pPr marL="0" indent="0">
+              <a:buNone/>
+            </a:pPr>
+            <a:endParaRPr lang="en-US" dirty="0"/>
+          </a:p>
+        </p:txBody>
+      </p:sp>
+    </p:spTree>
+    <p:extLst>
+      <p:ext uri="{BB962C8B-B14F-4D97-AF65-F5344CB8AC3E}">
+        <p14:creationId xmlns:p14="http://schemas.microsoft.com/office/powerpoint/2010/main" val="2677438532"/>
+      </p:ext>
+    </p:extLst>
+  </p:cSld>
+  <p:clrMapOvr>
+    <a:masterClrMapping/>
+  </p:clrMapOvr>
+</p:sld>
+</file>
+
+<file path=ppt/slides/slide7.xml><?xml version="1.0" encoding="utf-8"?>
+<p:sld xmlns:a="http://schemas.openxmlformats.org/drawingml/2006/main" xmlns:r="http://schemas.openxmlformats.org/officeDocument/2006/relationships" xmlns:p="http://schemas.openxmlformats.org/presentationml/2006/main">
+  <p:cSld>
+    <p:spTree>
+      <p:nvGrpSpPr>
+        <p:cNvPr id="1" name=""/>
+        <p:cNvGrpSpPr/>
+        <p:nvPr/>
+      </p:nvGrpSpPr>
+      <p:grpSpPr>
+        <a:xfrm>
+          <a:off x="0" y="0"/>
+          <a:ext cx="0" cy="0"/>
+          <a:chOff x="0" y="0"/>
+          <a:chExt cx="0" cy="0"/>
+        </a:xfrm>
+      </p:grpSpPr>
+      <p:sp>
+        <p:nvSpPr>
+          <p:cNvPr id="2" name="Title 1"/>
+          <p:cNvSpPr>
+            <a:spLocks noGrp="1"/>
+          </p:cNvSpPr>
+          <p:nvPr>
+            <p:ph type="title"/>
+          </p:nvPr>
+        </p:nvSpPr>
+        <p:spPr/>
+        <p:txBody>
+          <a:bodyPr/>
+          <a:lstStyle/>
+          <a:p>
+            <a:r>
+              <a:rPr lang="en-US" dirty="0" smtClean="0"/>
+              <a:t>Other </a:t>
+            </a:r>
+            <a:r>
+              <a:rPr lang="en-US" dirty="0" smtClean="0"/>
+              <a:t>Elements </a:t>
+            </a:r>
+            <a:r>
+              <a:rPr lang="en-US" dirty="0" smtClean="0"/>
+              <a:t>of a story</a:t>
+            </a:r>
+            <a:endParaRPr lang="en-US" dirty="0"/>
+          </a:p>
+        </p:txBody>
+      </p:sp>
+      <p:sp>
+        <p:nvSpPr>
+          <p:cNvPr id="3" name="Content Placeholder 2"/>
+          <p:cNvSpPr>
+            <a:spLocks noGrp="1"/>
+          </p:cNvSpPr>
+          <p:nvPr>
+            <p:ph idx="1"/>
+          </p:nvPr>
+        </p:nvSpPr>
+        <p:spPr/>
+        <p:txBody>
+          <a:bodyPr/>
+          <a:lstStyle/>
+          <a:p>
+            <a:r>
+              <a:rPr lang="en-US" dirty="0" smtClean="0"/>
+              <a:t>Point of view</a:t>
+            </a:r>
+          </a:p>
+          <a:p>
+            <a:r>
+              <a:rPr lang="en-US" dirty="0" smtClean="0"/>
+              <a:t>Dramatic Question</a:t>
+            </a:r>
+          </a:p>
+          <a:p>
+            <a:r>
+              <a:rPr lang="en-US" dirty="0" smtClean="0"/>
+              <a:t>Emotional content</a:t>
+            </a:r>
+          </a:p>
+          <a:p>
+            <a:endParaRPr lang="en-US" dirty="0" smtClean="0"/>
+          </a:p>
+        </p:txBody>
+      </p:sp>
+    </p:spTree>
+    <p:extLst>
+      <p:ext uri="{BB962C8B-B14F-4D97-AF65-F5344CB8AC3E}">
+        <p14:creationId xmlns:p14="http://schemas.microsoft.com/office/powerpoint/2010/main" val="2457425100"/>
+      </p:ext>
+    </p:extLst>
+  </p:cSld>
+  <p:clrMapOvr>
+    <a:masterClrMapping/>
+  </p:clrMapOvr>
+</p:sld>
+</file>
+
+<file path=ppt/slides/slide8.xml><?xml version="1.0" encoding="utf-8"?>
+<p:sld xmlns:a="http://schemas.openxmlformats.org/drawingml/2006/main" xmlns:r="http://schemas.openxmlformats.org/officeDocument/2006/relationships" xmlns:p="http://schemas.openxmlformats.org/presentationml/2006/main">
+  <p:cSld>
+    <p:spTree>
+      <p:nvGrpSpPr>
+        <p:cNvPr id="1" name=""/>
+        <p:cNvGrpSpPr/>
+        <p:nvPr/>
+      </p:nvGrpSpPr>
+      <p:grpSpPr>
+        <a:xfrm>
+          <a:off x="0" y="0"/>
+          <a:ext cx="0" cy="0"/>
+          <a:chOff x="0" y="0"/>
+          <a:chExt cx="0" cy="0"/>
+        </a:xfrm>
+      </p:grpSpPr>
+      <p:sp>
+        <p:nvSpPr>
+          <p:cNvPr id="2" name="Title 1"/>
+          <p:cNvSpPr>
+            <a:spLocks noGrp="1"/>
+          </p:cNvSpPr>
+          <p:nvPr>
+            <p:ph type="title"/>
+          </p:nvPr>
+        </p:nvSpPr>
+        <p:spPr/>
+        <p:txBody>
+          <a:bodyPr/>
+          <a:lstStyle/>
+          <a:p>
             <a:endParaRPr lang="en-US"/>
           </a:p>
         </p:txBody>
@@ -7910,6 +8377,86 @@
     <p:extLst>
       <p:ext uri="{BB962C8B-B14F-4D97-AF65-F5344CB8AC3E}">
         <p14:creationId xmlns:p14="http://schemas.microsoft.com/office/powerpoint/2010/main" val="1591643124"/>
+      </p:ext>
+    </p:extLst>
+  </p:cSld>
+  <p:clrMapOvr>
+    <a:masterClrMapping/>
+  </p:clrMapOvr>
+</p:sld>
+</file>
+
+<file path=ppt/slides/slide9.xml><?xml version="1.0" encoding="utf-8"?>
+<p:sld xmlns:a="http://schemas.openxmlformats.org/drawingml/2006/main" xmlns:r="http://schemas.openxmlformats.org/officeDocument/2006/relationships" xmlns:p="http://schemas.openxmlformats.org/presentationml/2006/main">
+  <p:cSld>
+    <p:spTree>
+      <p:nvGrpSpPr>
+        <p:cNvPr id="1" name=""/>
+        <p:cNvGrpSpPr/>
+        <p:nvPr/>
+      </p:nvGrpSpPr>
+      <p:grpSpPr>
+        <a:xfrm>
+          <a:off x="0" y="0"/>
+          <a:ext cx="0" cy="0"/>
+          <a:chOff x="0" y="0"/>
+          <a:chExt cx="0" cy="0"/>
+        </a:xfrm>
+      </p:grpSpPr>
+      <p:sp>
+        <p:nvSpPr>
+          <p:cNvPr id="2" name="Title 1"/>
+          <p:cNvSpPr>
+            <a:spLocks noGrp="1"/>
+          </p:cNvSpPr>
+          <p:nvPr>
+            <p:ph type="title"/>
+          </p:nvPr>
+        </p:nvSpPr>
+        <p:spPr/>
+        <p:txBody>
+          <a:bodyPr>
+            <a:normAutofit fontScale="90000"/>
+          </a:bodyPr>
+          <a:lstStyle/>
+          <a:p>
+            <a:r>
+              <a:rPr lang="en-US" dirty="0" smtClean="0"/>
+              <a:t>Visual Strategies for Storytelling</a:t>
+            </a:r>
+            <a:endParaRPr lang="en-US" dirty="0"/>
+          </a:p>
+        </p:txBody>
+      </p:sp>
+      <p:sp>
+        <p:nvSpPr>
+          <p:cNvPr id="3" name="Content Placeholder 2"/>
+          <p:cNvSpPr>
+            <a:spLocks noGrp="1"/>
+          </p:cNvSpPr>
+          <p:nvPr>
+            <p:ph idx="1"/>
+          </p:nvPr>
+        </p:nvSpPr>
+        <p:spPr/>
+        <p:txBody>
+          <a:bodyPr/>
+          <a:lstStyle/>
+          <a:p>
+            <a:r>
+              <a:rPr lang="en-US" dirty="0" smtClean="0"/>
+              <a:t>Color</a:t>
+            </a:r>
+          </a:p>
+          <a:p>
+            <a:endParaRPr lang="en-US" dirty="0"/>
+          </a:p>
+        </p:txBody>
+      </p:sp>
+    </p:spTree>
+    <p:extLst>
+      <p:ext uri="{BB962C8B-B14F-4D97-AF65-F5344CB8AC3E}">
+        <p14:creationId xmlns:p14="http://schemas.microsoft.com/office/powerpoint/2010/main" val="3597098501"/>
       </p:ext>
     </p:extLst>
   </p:cSld>

</xml_diff>

<commit_message>
updated storytelling ppt and resources page to add ppt file
</commit_message>
<xml_diff>
--- a/readings/storytelling.pptx
+++ b/readings/storytelling.pptx
@@ -8,11 +8,11 @@
     <p:sldId id="256" r:id="rId2"/>
     <p:sldId id="262" r:id="rId3"/>
     <p:sldId id="258" r:id="rId4"/>
-    <p:sldId id="259" r:id="rId5"/>
-    <p:sldId id="261" r:id="rId6"/>
+    <p:sldId id="261" r:id="rId5"/>
+    <p:sldId id="259" r:id="rId6"/>
     <p:sldId id="263" r:id="rId7"/>
-    <p:sldId id="257" r:id="rId8"/>
-    <p:sldId id="260" r:id="rId9"/>
+    <p:sldId id="266" r:id="rId8"/>
+    <p:sldId id="267" r:id="rId9"/>
     <p:sldId id="264" r:id="rId10"/>
     <p:sldId id="265" r:id="rId11"/>
   </p:sldIdLst>
@@ -7534,15 +7534,7 @@
           <a:p>
             <a:r>
               <a:rPr lang="en-US" dirty="0" smtClean="0"/>
-              <a:t>Storytelling </a:t>
-            </a:r>
-            <a:r>
-              <a:rPr lang="en-US" dirty="0" smtClean="0"/>
-              <a:t>with Data</a:t>
-            </a:r>
-            <a:r>
-              <a:rPr lang="en-US" dirty="0" smtClean="0"/>
-              <a:t>	</a:t>
+              <a:t>Storytelling with Data	</a:t>
             </a:r>
             <a:endParaRPr lang="en-US" dirty="0"/>
           </a:p>
@@ -7647,7 +7639,50 @@
           <a:bodyPr/>
           <a:lstStyle/>
           <a:p>
-            <a:endParaRPr lang="en-US" dirty="0"/>
+            <a:r>
+              <a:rPr lang="en-US" dirty="0" smtClean="0"/>
+              <a:t>What is the </a:t>
+            </a:r>
+            <a:r>
+              <a:rPr lang="en-US" dirty="0" smtClean="0"/>
+              <a:t>situation or context? </a:t>
+            </a:r>
+          </a:p>
+          <a:p>
+            <a:pPr lvl="1"/>
+            <a:r>
+              <a:rPr lang="en-US" dirty="0" smtClean="0"/>
+              <a:t>How will you make this known to your reader?</a:t>
+            </a:r>
+          </a:p>
+          <a:p>
+            <a:r>
+              <a:rPr lang="en-US" dirty="0" smtClean="0"/>
+              <a:t>What conflict or tension is being displayed?</a:t>
+            </a:r>
+          </a:p>
+          <a:p>
+            <a:r>
+              <a:rPr lang="en-US" dirty="0" smtClean="0"/>
+              <a:t>What is your resolution?</a:t>
+            </a:r>
+            <a:r>
+              <a:rPr lang="en-US" dirty="0"/>
+              <a:t> </a:t>
+            </a:r>
+            <a:r>
+              <a:rPr lang="en-US" dirty="0" smtClean="0"/>
+              <a:t>What do you want your audience to do or feel after viewing your </a:t>
+            </a:r>
+            <a:r>
+              <a:rPr lang="en-US" dirty="0" err="1" smtClean="0"/>
+              <a:t>infographic</a:t>
+            </a:r>
+            <a:r>
+              <a:rPr lang="en-US" dirty="0" smtClean="0"/>
+              <a:t>?</a:t>
+            </a:r>
+            <a:endParaRPr lang="en-US" dirty="0" smtClean="0"/>
           </a:p>
         </p:txBody>
       </p:sp>
@@ -7932,7 +7967,7 @@
           <a:p>
             <a:r>
               <a:rPr lang="en-US" dirty="0" smtClean="0"/>
-              <a:t>Storytelling with data</a:t>
+              <a:t>Parts of a Story</a:t>
             </a:r>
             <a:endParaRPr lang="en-US" dirty="0"/>
           </a:p>
@@ -7953,40 +7988,41 @@
           <a:bodyPr/>
           <a:lstStyle/>
           <a:p>
-            <a:r>
-              <a:rPr lang="en-US" dirty="0">
-                <a:hlinkClick r:id="rId2"/>
-              </a:rPr>
-              <a:t>https://www.youtube.com/watch?v=</a:t>
-            </a:r>
-            <a:r>
-              <a:rPr lang="en-US" dirty="0" smtClean="0">
-                <a:hlinkClick r:id="rId2"/>
-              </a:rPr>
-              <a:t>hVimVzgtD6w</a:t>
-            </a:r>
-            <a:endParaRPr lang="en-US" dirty="0" smtClean="0"/>
-          </a:p>
-          <a:p>
-            <a:endParaRPr lang="en-US" dirty="0"/>
-          </a:p>
-          <a:p>
+            <a:pPr marL="457200" indent="-457200">
+              <a:buFont typeface="+mj-lt"/>
+              <a:buAutoNum type="arabicPeriod"/>
+            </a:pPr>
             <a:r>
               <a:rPr lang="en-US" dirty="0" smtClean="0"/>
-              <a:t>What is the introduction</a:t>
-            </a:r>
-            <a:r>
-              <a:rPr lang="en-US" smtClean="0"/>
-              <a:t>/need?</a:t>
-            </a:r>
-            <a:endParaRPr lang="en-US" dirty="0"/>
+              <a:t>Introduction to the situation</a:t>
+            </a:r>
+          </a:p>
+          <a:p>
+            <a:pPr marL="457200" indent="-457200">
+              <a:buFont typeface="+mj-lt"/>
+              <a:buAutoNum type="arabicPeriod"/>
+            </a:pPr>
+            <a:r>
+              <a:rPr lang="en-US" dirty="0" smtClean="0"/>
+              <a:t>A series of events involving tension or conflict</a:t>
+            </a:r>
+          </a:p>
+          <a:p>
+            <a:pPr marL="457200" indent="-457200">
+              <a:buFont typeface="+mj-lt"/>
+              <a:buAutoNum type="arabicPeriod"/>
+            </a:pPr>
+            <a:r>
+              <a:rPr lang="en-US" dirty="0" smtClean="0"/>
+              <a:t>Resolution</a:t>
+            </a:r>
           </a:p>
         </p:txBody>
       </p:sp>
     </p:spTree>
     <p:extLst>
       <p:ext uri="{BB962C8B-B14F-4D97-AF65-F5344CB8AC3E}">
-        <p14:creationId xmlns:p14="http://schemas.microsoft.com/office/powerpoint/2010/main" val="1868045312"/>
+        <p14:creationId xmlns:p14="http://schemas.microsoft.com/office/powerpoint/2010/main" val="281591566"/>
       </p:ext>
     </p:extLst>
   </p:cSld>
@@ -8030,7 +8066,7 @@
           <a:p>
             <a:r>
               <a:rPr lang="en-US" dirty="0" smtClean="0"/>
-              <a:t>Parts of a Story</a:t>
+              <a:t>Storytelling with data</a:t>
             </a:r>
             <a:endParaRPr lang="en-US" dirty="0"/>
           </a:p>
@@ -8052,28 +8088,28 @@
           <a:lstStyle/>
           <a:p>
             <a:r>
-              <a:rPr lang="en-US" dirty="0" smtClean="0"/>
-              <a:t>Introduction to the situation</a:t>
-            </a:r>
-          </a:p>
-          <a:p>
-            <a:r>
-              <a:rPr lang="en-US" dirty="0" smtClean="0"/>
-              <a:t>A series of events involving tension or conflict</a:t>
-            </a:r>
-          </a:p>
-          <a:p>
-            <a:r>
-              <a:rPr lang="en-US" dirty="0" smtClean="0"/>
-              <a:t>Resolution</a:t>
-            </a:r>
+              <a:rPr lang="en-US" dirty="0">
+                <a:hlinkClick r:id="rId2"/>
+              </a:rPr>
+              <a:t>https://www.youtube.com/watch?v=</a:t>
+            </a:r>
+            <a:r>
+              <a:rPr lang="en-US" dirty="0" smtClean="0">
+                <a:hlinkClick r:id="rId2"/>
+              </a:rPr>
+              <a:t>hVimVzgtD6w</a:t>
+            </a:r>
+            <a:endParaRPr lang="en-US" dirty="0" smtClean="0"/>
+          </a:p>
+          <a:p>
+            <a:endParaRPr lang="en-US" dirty="0"/>
           </a:p>
         </p:txBody>
       </p:sp>
     </p:spTree>
     <p:extLst>
       <p:ext uri="{BB962C8B-B14F-4D97-AF65-F5344CB8AC3E}">
-        <p14:creationId xmlns:p14="http://schemas.microsoft.com/office/powerpoint/2010/main" val="281591566"/>
+        <p14:creationId xmlns:p14="http://schemas.microsoft.com/office/powerpoint/2010/main" val="1868045312"/>
       </p:ext>
     </p:extLst>
   </p:cSld>
@@ -8234,69 +8270,51 @@
           <a:bodyPr/>
           <a:lstStyle/>
           <a:p>
-            <a:r>
-              <a:rPr lang="en-US" dirty="0" smtClean="0"/>
-              <a:t>Other </a:t>
-            </a:r>
-            <a:r>
-              <a:rPr lang="en-US" dirty="0" smtClean="0"/>
-              <a:t>Elements </a:t>
-            </a:r>
-            <a:r>
-              <a:rPr lang="en-US" dirty="0" smtClean="0"/>
-              <a:t>of a story</a:t>
-            </a:r>
-            <a:endParaRPr lang="en-US" dirty="0"/>
-          </a:p>
-        </p:txBody>
-      </p:sp>
-      <p:sp>
-        <p:nvSpPr>
-          <p:cNvPr id="3" name="Content Placeholder 2"/>
-          <p:cNvSpPr>
-            <a:spLocks noGrp="1"/>
-          </p:cNvSpPr>
-          <p:nvPr>
-            <p:ph idx="1"/>
-          </p:nvPr>
-        </p:nvSpPr>
-        <p:spPr/>
-        <p:txBody>
-          <a:bodyPr/>
-          <a:lstStyle/>
-          <a:p>
-            <a:r>
-              <a:rPr lang="en-US" dirty="0" smtClean="0"/>
-              <a:t>Point of view</a:t>
-            </a:r>
-          </a:p>
-          <a:p>
-            <a:r>
-              <a:rPr lang="en-US" dirty="0" smtClean="0"/>
-              <a:t>Dramatic Question</a:t>
-            </a:r>
-          </a:p>
-          <a:p>
-            <a:r>
-              <a:rPr lang="en-US" dirty="0" smtClean="0"/>
-              <a:t>Emotional content</a:t>
-            </a:r>
-          </a:p>
-          <a:p>
-            <a:endParaRPr lang="en-US" dirty="0" smtClean="0"/>
-          </a:p>
-        </p:txBody>
-      </p:sp>
+            <a:endParaRPr lang="en-US"/>
+          </a:p>
+        </p:txBody>
+      </p:sp>
+      <p:pic>
+        <p:nvPicPr>
+          <p:cNvPr id="4" name="Picture 3"/>
+          <p:cNvPicPr>
+            <a:picLocks noChangeAspect="1"/>
+          </p:cNvPicPr>
+          <p:nvPr/>
+        </p:nvPicPr>
+        <p:blipFill>
+          <a:blip r:embed="rId2"/>
+          <a:stretch>
+            <a:fillRect/>
+          </a:stretch>
+        </p:blipFill>
+        <p:spPr>
+          <a:xfrm>
+            <a:off x="1993792" y="244158"/>
+            <a:ext cx="4677807" cy="6533336"/>
+          </a:xfrm>
+          <a:prstGeom prst="rect">
+            <a:avLst/>
+          </a:prstGeom>
+        </p:spPr>
+      </p:pic>
     </p:spTree>
     <p:extLst>
       <p:ext uri="{BB962C8B-B14F-4D97-AF65-F5344CB8AC3E}">
-        <p14:creationId xmlns:p14="http://schemas.microsoft.com/office/powerpoint/2010/main" val="2457425100"/>
+        <p14:creationId xmlns:p14="http://schemas.microsoft.com/office/powerpoint/2010/main" val="2269952299"/>
       </p:ext>
     </p:extLst>
   </p:cSld>
   <p:clrMapOvr>
     <a:masterClrMapping/>
   </p:clrMapOvr>
+  <p:timing>
+    <p:tnLst>
+      <p:par>
+        <p:cTn xmlns:p14="http://schemas.microsoft.com/office/powerpoint/2010/main" id="1" dur="indefinite" restart="never" nodeType="tmRoot"/>
+      </p:par>
+    </p:tnLst>
+  </p:timing>
 </p:sld>
 </file>
 
@@ -8336,53 +8354,47 @@
           </a:p>
         </p:txBody>
       </p:sp>
-      <p:sp>
-        <p:nvSpPr>
-          <p:cNvPr id="3" name="Content Placeholder 2"/>
-          <p:cNvSpPr>
-            <a:spLocks noGrp="1"/>
-          </p:cNvSpPr>
-          <p:nvPr>
-            <p:ph idx="1"/>
-          </p:nvPr>
-        </p:nvSpPr>
-        <p:spPr/>
-        <p:txBody>
-          <a:bodyPr/>
-          <a:lstStyle/>
-          <a:p>
-            <a:r>
-              <a:rPr lang="en-US" dirty="0" smtClean="0"/>
-              <a:t>Stories can’t be vague </a:t>
-            </a:r>
-          </a:p>
-          <a:p>
-            <a:r>
-              <a:rPr lang="en-US" dirty="0" smtClean="0"/>
-              <a:t>Stories must have a narrative arc that walks you through the story. </a:t>
-            </a:r>
-          </a:p>
-          <a:p>
-            <a:r>
-              <a:rPr lang="en-US" dirty="0" smtClean="0"/>
-              <a:t>Emotion can controlled through color, interactivity</a:t>
-            </a:r>
-          </a:p>
-          <a:p>
-            <a:endParaRPr lang="en-US" dirty="0" smtClean="0"/>
-          </a:p>
-        </p:txBody>
-      </p:sp>
+      <p:pic>
+        <p:nvPicPr>
+          <p:cNvPr id="6" name="Picture 5"/>
+          <p:cNvPicPr>
+            <a:picLocks noChangeAspect="1"/>
+          </p:cNvPicPr>
+          <p:nvPr/>
+        </p:nvPicPr>
+        <p:blipFill>
+          <a:blip r:embed="rId2"/>
+          <a:stretch>
+            <a:fillRect/>
+          </a:stretch>
+        </p:blipFill>
+        <p:spPr>
+          <a:xfrm>
+            <a:off x="1988541" y="0"/>
+            <a:ext cx="4477604" cy="6716406"/>
+          </a:xfrm>
+          <a:prstGeom prst="rect">
+            <a:avLst/>
+          </a:prstGeom>
+        </p:spPr>
+      </p:pic>
     </p:spTree>
     <p:extLst>
       <p:ext uri="{BB962C8B-B14F-4D97-AF65-F5344CB8AC3E}">
-        <p14:creationId xmlns:p14="http://schemas.microsoft.com/office/powerpoint/2010/main" val="1591643124"/>
+        <p14:creationId xmlns:p14="http://schemas.microsoft.com/office/powerpoint/2010/main" val="323411036"/>
       </p:ext>
     </p:extLst>
   </p:cSld>
   <p:clrMapOvr>
     <a:masterClrMapping/>
   </p:clrMapOvr>
+  <p:timing>
+    <p:tnLst>
+      <p:par>
+        <p:cTn xmlns:p14="http://schemas.microsoft.com/office/powerpoint/2010/main" id="1" dur="indefinite" restart="never" nodeType="tmRoot"/>
+      </p:par>
+    </p:tnLst>
+  </p:timing>
 </p:sld>
 </file>
 
@@ -8445,8 +8457,23 @@
           <a:p>
             <a:r>
               <a:rPr lang="en-US" dirty="0" smtClean="0"/>
-              <a:t>Color</a:t>
-            </a:r>
+              <a:t>Color – Used to convey emotion</a:t>
+            </a:r>
+          </a:p>
+          <a:p>
+            <a:r>
+              <a:rPr lang="en-US" dirty="0" smtClean="0"/>
+              <a:t>Repetition </a:t>
+            </a:r>
+          </a:p>
+          <a:p>
+            <a:r>
+              <a:rPr lang="en-US" dirty="0" smtClean="0"/>
+              <a:t>Proximity (Gestalt Psychology) </a:t>
+            </a:r>
+          </a:p>
+          <a:p>
+            <a:endParaRPr lang="en-US" dirty="0" smtClean="0"/>
           </a:p>
           <a:p>
             <a:endParaRPr lang="en-US" dirty="0"/>
@@ -8463,6 +8490,13 @@
   <p:clrMapOvr>
     <a:masterClrMapping/>
   </p:clrMapOvr>
+  <p:timing>
+    <p:tnLst>
+      <p:par>
+        <p:cTn xmlns:p14="http://schemas.microsoft.com/office/powerpoint/2010/main" id="1" dur="indefinite" restart="never" nodeType="tmRoot"/>
+      </p:par>
+    </p:tnLst>
+  </p:timing>
 </p:sld>
 </file>
 

</xml_diff>